<commit_message>
More hymns, as usual.
</commit_message>
<xml_diff>
--- a/379 - Take my Life and Let it Be.pptx
+++ b/379 - Take my Life and Let it Be.pptx
@@ -246,7 +246,7 @@
           <a:p>
             <a:fld id="{32F7251A-AE54-443C-B8FE-5F636E835EBF}" type="datetimeFigureOut">
               <a:rPr lang="en-US" smtClean="0"/>
-              <a:t>7/23/2017</a:t>
+              <a:t>8/12/2017</a:t>
             </a:fld>
             <a:endParaRPr lang="en-US"/>
           </a:p>
@@ -414,7 +414,7 @@
           <a:p>
             <a:fld id="{32F7251A-AE54-443C-B8FE-5F636E835EBF}" type="datetimeFigureOut">
               <a:rPr lang="en-US" smtClean="0"/>
-              <a:t>7/23/2017</a:t>
+              <a:t>8/12/2017</a:t>
             </a:fld>
             <a:endParaRPr lang="en-US"/>
           </a:p>
@@ -592,7 +592,7 @@
           <a:p>
             <a:fld id="{32F7251A-AE54-443C-B8FE-5F636E835EBF}" type="datetimeFigureOut">
               <a:rPr lang="en-US" smtClean="0"/>
-              <a:t>7/23/2017</a:t>
+              <a:t>8/12/2017</a:t>
             </a:fld>
             <a:endParaRPr lang="en-US"/>
           </a:p>
@@ -760,7 +760,7 @@
           <a:p>
             <a:fld id="{32F7251A-AE54-443C-B8FE-5F636E835EBF}" type="datetimeFigureOut">
               <a:rPr lang="en-US" smtClean="0"/>
-              <a:t>7/23/2017</a:t>
+              <a:t>8/12/2017</a:t>
             </a:fld>
             <a:endParaRPr lang="en-US"/>
           </a:p>
@@ -1005,7 +1005,7 @@
           <a:p>
             <a:fld id="{32F7251A-AE54-443C-B8FE-5F636E835EBF}" type="datetimeFigureOut">
               <a:rPr lang="en-US" smtClean="0"/>
-              <a:t>7/23/2017</a:t>
+              <a:t>8/12/2017</a:t>
             </a:fld>
             <a:endParaRPr lang="en-US"/>
           </a:p>
@@ -1234,7 +1234,7 @@
           <a:p>
             <a:fld id="{32F7251A-AE54-443C-B8FE-5F636E835EBF}" type="datetimeFigureOut">
               <a:rPr lang="en-US" smtClean="0"/>
-              <a:t>7/23/2017</a:t>
+              <a:t>8/12/2017</a:t>
             </a:fld>
             <a:endParaRPr lang="en-US"/>
           </a:p>
@@ -1598,7 +1598,7 @@
           <a:p>
             <a:fld id="{32F7251A-AE54-443C-B8FE-5F636E835EBF}" type="datetimeFigureOut">
               <a:rPr lang="en-US" smtClean="0"/>
-              <a:t>7/23/2017</a:t>
+              <a:t>8/12/2017</a:t>
             </a:fld>
             <a:endParaRPr lang="en-US"/>
           </a:p>
@@ -1715,7 +1715,7 @@
           <a:p>
             <a:fld id="{32F7251A-AE54-443C-B8FE-5F636E835EBF}" type="datetimeFigureOut">
               <a:rPr lang="en-US" smtClean="0"/>
-              <a:t>7/23/2017</a:t>
+              <a:t>8/12/2017</a:t>
             </a:fld>
             <a:endParaRPr lang="en-US"/>
           </a:p>
@@ -1810,7 +1810,7 @@
           <a:p>
             <a:fld id="{32F7251A-AE54-443C-B8FE-5F636E835EBF}" type="datetimeFigureOut">
               <a:rPr lang="en-US" smtClean="0"/>
-              <a:t>7/23/2017</a:t>
+              <a:t>8/12/2017</a:t>
             </a:fld>
             <a:endParaRPr lang="en-US"/>
           </a:p>
@@ -2085,7 +2085,7 @@
           <a:p>
             <a:fld id="{32F7251A-AE54-443C-B8FE-5F636E835EBF}" type="datetimeFigureOut">
               <a:rPr lang="en-US" smtClean="0"/>
-              <a:t>7/23/2017</a:t>
+              <a:t>8/12/2017</a:t>
             </a:fld>
             <a:endParaRPr lang="en-US"/>
           </a:p>
@@ -2337,7 +2337,7 @@
           <a:p>
             <a:fld id="{32F7251A-AE54-443C-B8FE-5F636E835EBF}" type="datetimeFigureOut">
               <a:rPr lang="en-US" smtClean="0"/>
-              <a:t>7/23/2017</a:t>
+              <a:t>8/12/2017</a:t>
             </a:fld>
             <a:endParaRPr lang="en-US"/>
           </a:p>
@@ -2551,7 +2551,7 @@
           <a:p>
             <a:fld id="{32F7251A-AE54-443C-B8FE-5F636E835EBF}" type="datetimeFigureOut">
               <a:rPr lang="en-US" smtClean="0"/>
-              <a:t>7/23/2017</a:t>
+              <a:t>8/12/2017</a:t>
             </a:fld>
             <a:endParaRPr lang="en-US"/>
           </a:p>

</xml_diff>